<commit_message>
Components routing y forms
</commit_message>
<xml_diff>
--- a/netcoreconf23_BCN_BlazorNoWayHome.pptx
+++ b/netcoreconf23_BCN_BlazorNoWayHome.pptx
@@ -5111,6 +5111,166 @@
 </file>
 
 <file path=ppt/notesSlides/notesSlide1.xml><?xml version="1.0" encoding="utf-8"?>
+<p:notes xmlns:a="http://schemas.openxmlformats.org/drawingml/2006/main" xmlns:r="http://schemas.openxmlformats.org/officeDocument/2006/relationships" xmlns:p="http://schemas.openxmlformats.org/presentationml/2006/main">
+  <p:cSld>
+    <p:spTree>
+      <p:nvGrpSpPr>
+        <p:cNvPr id="1" name=""/>
+        <p:cNvGrpSpPr/>
+        <p:nvPr/>
+      </p:nvGrpSpPr>
+      <p:grpSpPr>
+        <a:xfrm>
+          <a:off x="0" y="0"/>
+          <a:ext cx="0" cy="0"/>
+          <a:chOff x="0" y="0"/>
+          <a:chExt cx="0" cy="0"/>
+        </a:xfrm>
+      </p:grpSpPr>
+      <p:sp>
+        <p:nvSpPr>
+          <p:cNvPr id="2" name="Marcador de imagen de diapositiva 1"/>
+          <p:cNvSpPr>
+            <a:spLocks noGrp="1" noRot="1" noChangeAspect="1"/>
+          </p:cNvSpPr>
+          <p:nvPr>
+            <p:ph type="sldImg"/>
+          </p:nvPr>
+        </p:nvSpPr>
+        <p:spPr/>
+      </p:sp>
+      <p:sp>
+        <p:nvSpPr>
+          <p:cNvPr id="3" name="Marcador de notas 2"/>
+          <p:cNvSpPr>
+            <a:spLocks noGrp="1"/>
+          </p:cNvSpPr>
+          <p:nvPr>
+            <p:ph type="body" idx="1"/>
+          </p:nvPr>
+        </p:nvSpPr>
+        <p:spPr/>
+        <p:txBody>
+          <a:bodyPr/>
+          <a:lstStyle/>
+          <a:p>
+            <a:pPr marL="0" lvl="0" indent="0" algn="l" rtl="0">
+              <a:spcBef>
+                <a:spcPts val="0"/>
+              </a:spcBef>
+              <a:spcAft>
+                <a:spcPts val="0"/>
+              </a:spcAft>
+              <a:buNone/>
+            </a:pPr>
+            <a:r>
+              <a:rPr lang="es-ES" dirty="0"/>
+              <a:t>Componente </a:t>
+            </a:r>
+            <a:r>
+              <a:rPr lang="es-ES" dirty="0" err="1"/>
+              <a:t>Router</a:t>
+            </a:r>
+            <a:r>
+              <a:rPr lang="es-ES" dirty="0"/>
+              <a:t> localiza todas las páginas de nuestra aplicación (componentes con directiva @page) y crea la tabla de rutas (</a:t>
+            </a:r>
+            <a:r>
+              <a:rPr lang="es-ES" dirty="0" err="1"/>
+              <a:t>App.razor</a:t>
+            </a:r>
+            <a:r>
+              <a:rPr lang="es-ES" dirty="0"/>
+              <a:t>). </a:t>
+            </a:r>
+            <a:br>
+              <a:rPr lang="es-ES" dirty="0"/>
+            </a:br>
+            <a:r>
+              <a:rPr lang="es-ES" dirty="0"/>
+              <a:t>- </a:t>
+            </a:r>
+            <a:r>
+              <a:rPr lang="es-ES" dirty="0" err="1"/>
+              <a:t>AppAssembly</a:t>
+            </a:r>
+            <a:r>
+              <a:rPr lang="es-ES" dirty="0"/>
+              <a:t> referencia al proyecto actual</a:t>
+            </a:r>
+            <a:br>
+              <a:rPr lang="es-ES" dirty="0"/>
+            </a:br>
+            <a:r>
+              <a:rPr lang="es-ES" dirty="0"/>
+              <a:t>- Cuando se encuentra la ruta, se renderiza este fragmento</a:t>
+            </a:r>
+          </a:p>
+          <a:p>
+            <a:pPr marL="0" lvl="0" indent="0" algn="l" rtl="0">
+              <a:spcBef>
+                <a:spcPts val="0"/>
+              </a:spcBef>
+              <a:spcAft>
+                <a:spcPts val="0"/>
+              </a:spcAft>
+              <a:buNone/>
+            </a:pPr>
+            <a:r>
+              <a:rPr lang="es-ES" dirty="0"/>
+              <a:t>- </a:t>
+            </a:r>
+            <a:r>
+              <a:rPr lang="es-ES" dirty="0" err="1"/>
+              <a:t>ROuteView</a:t>
+            </a:r>
+            <a:r>
+              <a:rPr lang="es-ES" dirty="0"/>
+              <a:t> renderiza la página</a:t>
+            </a:r>
+          </a:p>
+          <a:p>
+            <a:endParaRPr lang="es-ES" dirty="0"/>
+          </a:p>
+        </p:txBody>
+      </p:sp>
+      <p:sp>
+        <p:nvSpPr>
+          <p:cNvPr id="4" name="Marcador de número de diapositiva 3"/>
+          <p:cNvSpPr>
+            <a:spLocks noGrp="1"/>
+          </p:cNvSpPr>
+          <p:nvPr>
+            <p:ph type="sldNum" sz="quarter" idx="5"/>
+          </p:nvPr>
+        </p:nvSpPr>
+        <p:spPr/>
+        <p:txBody>
+          <a:bodyPr/>
+          <a:lstStyle/>
+          <a:p>
+            <a:fld id="{5201BD0E-354B-C440-9698-83F7F74945AC}" type="slidenum">
+              <a:rPr lang="es-ES_tradnl" smtClean="0"/>
+              <a:t>11</a:t>
+            </a:fld>
+            <a:endParaRPr lang="es-ES_tradnl"/>
+          </a:p>
+        </p:txBody>
+      </p:sp>
+    </p:spTree>
+    <p:extLst>
+      <p:ext uri="{BB962C8B-B14F-4D97-AF65-F5344CB8AC3E}">
+        <p14:creationId xmlns:p14="http://schemas.microsoft.com/office/powerpoint/2010/main" val="2551638262"/>
+      </p:ext>
+    </p:extLst>
+  </p:cSld>
+  <p:clrMapOvr>
+    <a:masterClrMapping/>
+  </p:clrMapOvr>
+</p:notes>
+</file>
+
+<file path=ppt/notesSlides/notesSlide2.xml><?xml version="1.0" encoding="utf-8"?>
 <p:notes xmlns:a="http://schemas.openxmlformats.org/drawingml/2006/main" xmlns:r="http://schemas.openxmlformats.org/officeDocument/2006/relationships" xmlns:p="http://schemas.openxmlformats.org/presentationml/2006/main">
   <p:cSld>
     <p:spTree>
@@ -9360,7 +9520,10 @@
             </a:lvl1pPr>
           </a:lstStyle>
           <a:p>
-            <a:pPr algn="just"/>
+            <a:pPr marL="342900" indent="-342900" algn="just">
+              <a:buFont typeface="Arial" panose="020B0604020202020204" pitchFamily="34" charset="0"/>
+              <a:buChar char="•"/>
+            </a:pPr>
             <a:r>
               <a:rPr lang="es-ES" sz="2000" dirty="0">
                 <a:solidFill>
@@ -9368,7 +9531,247 @@
                 </a:solidFill>
                 <a:latin typeface="Segoe UI" panose="020B0502040204020203" pitchFamily="34" charset="0"/>
               </a:rPr>
-              <a:t>AAAAAAAAAA</a:t>
+              <a:t>Reusable UI </a:t>
+            </a:r>
+            <a:r>
+              <a:rPr lang="es-ES" sz="2000" dirty="0" err="1">
+                <a:solidFill>
+                  <a:srgbClr val="171717"/>
+                </a:solidFill>
+                <a:latin typeface="Segoe UI" panose="020B0502040204020203" pitchFamily="34" charset="0"/>
+              </a:rPr>
+              <a:t>Components</a:t>
+            </a:r>
+            <a:endParaRPr lang="es-ES" sz="2000" dirty="0">
+              <a:solidFill>
+                <a:srgbClr val="171717"/>
+              </a:solidFill>
+              <a:latin typeface="Segoe UI" panose="020B0502040204020203" pitchFamily="34" charset="0"/>
+            </a:endParaRPr>
+          </a:p>
+          <a:p>
+            <a:pPr marL="342900" indent="-342900" algn="just">
+              <a:buFont typeface="Arial" panose="020B0604020202020204" pitchFamily="34" charset="0"/>
+              <a:buChar char="•"/>
+            </a:pPr>
+            <a:r>
+              <a:rPr lang="es-ES" sz="2000" dirty="0" err="1">
+                <a:solidFill>
+                  <a:srgbClr val="171717"/>
+                </a:solidFill>
+                <a:latin typeface="Segoe UI" panose="020B0502040204020203" pitchFamily="34" charset="0"/>
+              </a:rPr>
+              <a:t>Razor</a:t>
+            </a:r>
+            <a:r>
+              <a:rPr lang="es-ES" sz="2000" dirty="0">
+                <a:solidFill>
+                  <a:srgbClr val="171717"/>
+                </a:solidFill>
+                <a:latin typeface="Segoe UI" panose="020B0502040204020203" pitchFamily="34" charset="0"/>
+              </a:rPr>
+              <a:t> </a:t>
+            </a:r>
+            <a:r>
+              <a:rPr lang="es-ES" sz="2000" dirty="0" err="1">
+                <a:solidFill>
+                  <a:srgbClr val="171717"/>
+                </a:solidFill>
+                <a:latin typeface="Segoe UI" panose="020B0502040204020203" pitchFamily="34" charset="0"/>
+              </a:rPr>
+              <a:t>syntax</a:t>
+            </a:r>
+            <a:endParaRPr lang="es-ES" sz="2000" dirty="0">
+              <a:solidFill>
+                <a:srgbClr val="171717"/>
+              </a:solidFill>
+              <a:latin typeface="Segoe UI" panose="020B0502040204020203" pitchFamily="34" charset="0"/>
+            </a:endParaRPr>
+          </a:p>
+          <a:p>
+            <a:pPr marL="342900" indent="-342900" algn="just">
+              <a:buFont typeface="Arial" panose="020B0604020202020204" pitchFamily="34" charset="0"/>
+              <a:buChar char="•"/>
+            </a:pPr>
+            <a:r>
+              <a:rPr lang="es-ES" sz="2000" dirty="0" err="1">
+                <a:solidFill>
+                  <a:srgbClr val="171717"/>
+                </a:solidFill>
+                <a:latin typeface="Segoe UI" panose="020B0502040204020203" pitchFamily="34" charset="0"/>
+              </a:rPr>
+              <a:t>Parametrs</a:t>
+            </a:r>
+            <a:endParaRPr lang="es-ES" sz="2000" dirty="0">
+              <a:solidFill>
+                <a:srgbClr val="171717"/>
+              </a:solidFill>
+              <a:latin typeface="Segoe UI" panose="020B0502040204020203" pitchFamily="34" charset="0"/>
+            </a:endParaRPr>
+          </a:p>
+          <a:p>
+            <a:pPr marL="342900" indent="-342900" algn="just">
+              <a:buFont typeface="Arial" panose="020B0604020202020204" pitchFamily="34" charset="0"/>
+              <a:buChar char="•"/>
+            </a:pPr>
+            <a:r>
+              <a:rPr lang="es-ES" sz="2000" dirty="0" err="1">
+                <a:solidFill>
+                  <a:srgbClr val="171717"/>
+                </a:solidFill>
+                <a:latin typeface="Segoe UI" panose="020B0502040204020203" pitchFamily="34" charset="0"/>
+              </a:rPr>
+              <a:t>Testing</a:t>
+            </a:r>
+            <a:endParaRPr lang="es-ES" sz="2000" dirty="0">
+              <a:solidFill>
+                <a:srgbClr val="171717"/>
+              </a:solidFill>
+              <a:latin typeface="Segoe UI" panose="020B0502040204020203" pitchFamily="34" charset="0"/>
+            </a:endParaRPr>
+          </a:p>
+          <a:p>
+            <a:pPr marL="342900" indent="-342900" algn="just">
+              <a:buFont typeface="Arial" panose="020B0604020202020204" pitchFamily="34" charset="0"/>
+              <a:buChar char="•"/>
+            </a:pPr>
+            <a:r>
+              <a:rPr lang="es-ES" sz="2000" dirty="0" err="1">
+                <a:solidFill>
+                  <a:srgbClr val="171717"/>
+                </a:solidFill>
+                <a:latin typeface="Segoe UI" panose="020B0502040204020203" pitchFamily="34" charset="0"/>
+              </a:rPr>
+              <a:t>Razor</a:t>
+            </a:r>
+            <a:r>
+              <a:rPr lang="es-ES" sz="2000" dirty="0">
+                <a:solidFill>
+                  <a:srgbClr val="171717"/>
+                </a:solidFill>
+                <a:latin typeface="Segoe UI" panose="020B0502040204020203" pitchFamily="34" charset="0"/>
+              </a:rPr>
+              <a:t> </a:t>
+            </a:r>
+            <a:r>
+              <a:rPr lang="es-ES" sz="2000" dirty="0" err="1">
+                <a:solidFill>
+                  <a:srgbClr val="171717"/>
+                </a:solidFill>
+                <a:latin typeface="Segoe UI" panose="020B0502040204020203" pitchFamily="34" charset="0"/>
+              </a:rPr>
+              <a:t>Libraries</a:t>
+            </a:r>
+            <a:endParaRPr lang="es-ES" sz="2000" dirty="0">
+              <a:solidFill>
+                <a:srgbClr val="171717"/>
+              </a:solidFill>
+              <a:latin typeface="Segoe UI" panose="020B0502040204020203" pitchFamily="34" charset="0"/>
+            </a:endParaRPr>
+          </a:p>
+          <a:p>
+            <a:pPr marL="342900" indent="-342900" algn="just">
+              <a:buFont typeface="Arial" panose="020B0604020202020204" pitchFamily="34" charset="0"/>
+              <a:buChar char="•"/>
+            </a:pPr>
+            <a:r>
+              <a:rPr lang="en-US" sz="2000" dirty="0">
+                <a:solidFill>
+                  <a:srgbClr val="171717"/>
+                </a:solidFill>
+                <a:latin typeface="Segoe UI" panose="020B0502040204020203" pitchFamily="34" charset="0"/>
+              </a:rPr>
+              <a:t>Examples:</a:t>
+            </a:r>
+          </a:p>
+          <a:p>
+            <a:pPr algn="just"/>
+            <a:r>
+              <a:rPr lang="en-US" sz="2000" dirty="0">
+                <a:solidFill>
+                  <a:srgbClr val="171717"/>
+                </a:solidFill>
+                <a:latin typeface="Segoe UI" panose="020B0502040204020203" pitchFamily="34" charset="0"/>
+              </a:rPr>
+              <a:t>	</a:t>
+            </a:r>
+            <a:r>
+              <a:rPr lang="es-ES" sz="2000" dirty="0">
+                <a:solidFill>
+                  <a:srgbClr val="171717"/>
+                </a:solidFill>
+                <a:latin typeface="Segoe UI" panose="020B0502040204020203" pitchFamily="34" charset="0"/>
+              </a:rPr>
+              <a:t> NetCoreConfBCN23.</a:t>
+            </a:r>
+            <a:r>
+              <a:rPr lang="en-US" sz="2000" dirty="0">
+                <a:solidFill>
+                  <a:srgbClr val="171717"/>
+                </a:solidFill>
+                <a:latin typeface="Segoe UI" panose="020B0502040204020203" pitchFamily="34" charset="0"/>
+              </a:rPr>
+              <a:t>Components</a:t>
+            </a:r>
+          </a:p>
+          <a:p>
+            <a:pPr algn="just"/>
+            <a:r>
+              <a:rPr lang="en-US" sz="2000" dirty="0">
+                <a:solidFill>
+                  <a:srgbClr val="171717"/>
+                </a:solidFill>
+                <a:latin typeface="Segoe UI" panose="020B0502040204020203" pitchFamily="34" charset="0"/>
+              </a:rPr>
+              <a:t>	</a:t>
+            </a:r>
+            <a:r>
+              <a:rPr lang="es-ES" sz="2000" dirty="0">
+                <a:solidFill>
+                  <a:srgbClr val="171717"/>
+                </a:solidFill>
+                <a:latin typeface="Segoe UI" panose="020B0502040204020203" pitchFamily="34" charset="0"/>
+              </a:rPr>
+              <a:t> NetCoreConfBCN23.</a:t>
+            </a:r>
+            <a:r>
+              <a:rPr lang="en-US" sz="2000" dirty="0">
+                <a:solidFill>
+                  <a:srgbClr val="171717"/>
+                </a:solidFill>
+                <a:latin typeface="Segoe UI" panose="020B0502040204020203" pitchFamily="34" charset="0"/>
+              </a:rPr>
+              <a:t>Shared</a:t>
+            </a:r>
+          </a:p>
+          <a:p>
+            <a:pPr algn="just"/>
+            <a:r>
+              <a:rPr lang="en-US" sz="2000" dirty="0">
+                <a:solidFill>
+                  <a:srgbClr val="171717"/>
+                </a:solidFill>
+                <a:latin typeface="Segoe UI" panose="020B0502040204020203" pitchFamily="34" charset="0"/>
+              </a:rPr>
+              <a:t>	</a:t>
+            </a:r>
+            <a:r>
+              <a:rPr lang="es-ES" sz="2000" dirty="0">
+                <a:solidFill>
+                  <a:srgbClr val="171717"/>
+                </a:solidFill>
+                <a:latin typeface="Segoe UI" panose="020B0502040204020203" pitchFamily="34" charset="0"/>
+              </a:rPr>
+              <a:t> NetCoreConfBCN23.</a:t>
+            </a:r>
+            <a:r>
+              <a:rPr lang="en-US" sz="2000" dirty="0" err="1">
+                <a:solidFill>
+                  <a:srgbClr val="171717"/>
+                </a:solidFill>
+                <a:latin typeface="Segoe UI" panose="020B0502040204020203" pitchFamily="34" charset="0"/>
+              </a:rPr>
+              <a:t>Shared.Tests</a:t>
             </a:r>
             <a:endParaRPr lang="en-US" sz="2000" dirty="0">
               <a:solidFill>
@@ -9486,7 +9889,82 @@
             </a:lvl1pPr>
           </a:lstStyle>
           <a:p>
-            <a:pPr algn="just"/>
+            <a:pPr marL="342900" indent="-342900" algn="just">
+              <a:buFont typeface="Arial" panose="020B0604020202020204" pitchFamily="34" charset="0"/>
+              <a:buChar char="•"/>
+            </a:pPr>
+            <a:r>
+              <a:rPr lang="es-ES" sz="2000" dirty="0" err="1">
+                <a:solidFill>
+                  <a:srgbClr val="171717"/>
+                </a:solidFill>
+                <a:latin typeface="Segoe UI" panose="020B0502040204020203" pitchFamily="34" charset="0"/>
+              </a:rPr>
+              <a:t>Router</a:t>
+            </a:r>
+            <a:endParaRPr lang="es-ES" sz="2000" dirty="0">
+              <a:solidFill>
+                <a:srgbClr val="171717"/>
+              </a:solidFill>
+              <a:latin typeface="Segoe UI" panose="020B0502040204020203" pitchFamily="34" charset="0"/>
+            </a:endParaRPr>
+          </a:p>
+          <a:p>
+            <a:pPr marL="342900" indent="-342900" algn="just">
+              <a:buFont typeface="Arial" panose="020B0604020202020204" pitchFamily="34" charset="0"/>
+              <a:buChar char="•"/>
+            </a:pPr>
+            <a:r>
+              <a:rPr lang="es-ES" sz="2000" dirty="0" err="1">
+                <a:solidFill>
+                  <a:srgbClr val="171717"/>
+                </a:solidFill>
+                <a:latin typeface="Segoe UI" panose="020B0502040204020203" pitchFamily="34" charset="0"/>
+              </a:rPr>
+              <a:t>NavigationManager</a:t>
+            </a:r>
+            <a:endParaRPr lang="es-ES" sz="2000" dirty="0">
+              <a:solidFill>
+                <a:srgbClr val="171717"/>
+              </a:solidFill>
+              <a:latin typeface="Segoe UI" panose="020B0502040204020203" pitchFamily="34" charset="0"/>
+            </a:endParaRPr>
+          </a:p>
+          <a:p>
+            <a:pPr marL="342900" indent="-342900" algn="just">
+              <a:buFont typeface="Arial" panose="020B0604020202020204" pitchFamily="34" charset="0"/>
+              <a:buChar char="•"/>
+            </a:pPr>
+            <a:r>
+              <a:rPr lang="es-ES" sz="2000" dirty="0" err="1">
+                <a:solidFill>
+                  <a:srgbClr val="171717"/>
+                </a:solidFill>
+                <a:latin typeface="Segoe UI" panose="020B0502040204020203" pitchFamily="34" charset="0"/>
+              </a:rPr>
+              <a:t>NavLink</a:t>
+            </a:r>
+            <a:endParaRPr lang="es-ES" sz="2000" dirty="0">
+              <a:solidFill>
+                <a:srgbClr val="171717"/>
+              </a:solidFill>
+              <a:latin typeface="Segoe UI" panose="020B0502040204020203" pitchFamily="34" charset="0"/>
+            </a:endParaRPr>
+          </a:p>
+          <a:p>
+            <a:pPr marL="342900" indent="-342900" algn="just">
+              <a:buFont typeface="Arial" panose="020B0604020202020204" pitchFamily="34" charset="0"/>
+              <a:buChar char="•"/>
+            </a:pPr>
+            <a:r>
+              <a:rPr lang="es-ES" sz="2000" dirty="0" err="1">
+                <a:solidFill>
+                  <a:srgbClr val="171717"/>
+                </a:solidFill>
+                <a:latin typeface="Segoe UI" panose="020B0502040204020203" pitchFamily="34" charset="0"/>
+              </a:rPr>
+              <a:t>Example</a:t>
+            </a:r>
             <a:r>
               <a:rPr lang="es-ES" sz="2000" dirty="0">
                 <a:solidFill>
@@ -9494,7 +9972,19 @@
                 </a:solidFill>
                 <a:latin typeface="Segoe UI" panose="020B0502040204020203" pitchFamily="34" charset="0"/>
               </a:rPr>
-              <a:t>AAAAAA</a:t>
+              <a:t>: </a:t>
+            </a:r>
+          </a:p>
+          <a:p>
+            <a:pPr algn="just"/>
+            <a:r>
+              <a:rPr lang="es-ES" sz="2000" dirty="0">
+                <a:solidFill>
+                  <a:srgbClr val="171717"/>
+                </a:solidFill>
+                <a:latin typeface="Segoe UI" panose="020B0502040204020203" pitchFamily="34" charset="0"/>
+              </a:rPr>
+              <a:t>	NetCoreConfBCN23.Routing</a:t>
             </a:r>
             <a:endParaRPr lang="en-US" sz="2000" dirty="0">
               <a:solidFill>
@@ -13029,10 +13519,7 @@
             </a:r>
           </a:p>
           <a:p>
-            <a:pPr marL="342900" indent="-342900" algn="just">
-              <a:buFont typeface="Arial" panose="020B0604020202020204" pitchFamily="34" charset="0"/>
-              <a:buChar char="•"/>
-            </a:pPr>
+            <a:pPr algn="just"/>
             <a:r>
               <a:rPr lang="en-US" sz="1800" dirty="0">
                 <a:solidFill>
@@ -13040,7 +13527,7 @@
                 </a:solidFill>
                 <a:latin typeface="Segoe UI" panose="020B0502040204020203" pitchFamily="34" charset="0"/>
               </a:rPr>
-              <a:t>	Mouse biding: </a:t>
+              <a:t>	Mouse binding: </a:t>
             </a:r>
             <a:r>
               <a:rPr lang="en-US" sz="1600" dirty="0">
@@ -13256,35 +13743,191 @@
               <a:buChar char="•"/>
             </a:pPr>
             <a:r>
+              <a:rPr lang="en-US" sz="2000" dirty="0" err="1">
+                <a:solidFill>
+                  <a:schemeClr val="tx1"/>
+                </a:solidFill>
+                <a:latin typeface="Segoe UI" panose="020B0502040204020203" pitchFamily="34" charset="0"/>
+              </a:rPr>
+              <a:t>EditForm</a:t>
+            </a:r>
+            <a:endParaRPr lang="en-US" sz="2000" dirty="0">
+              <a:solidFill>
+                <a:schemeClr val="tx1"/>
+              </a:solidFill>
+              <a:latin typeface="Segoe UI" panose="020B0502040204020203" pitchFamily="34" charset="0"/>
+            </a:endParaRPr>
+          </a:p>
+          <a:p>
+            <a:pPr algn="just"/>
+            <a:r>
+              <a:rPr lang="en-US" sz="2000" dirty="0">
+                <a:solidFill>
+                  <a:schemeClr val="tx1"/>
+                </a:solidFill>
+                <a:latin typeface="Segoe UI" panose="020B0502040204020203" pitchFamily="34" charset="0"/>
+              </a:rPr>
+              <a:t>	</a:t>
+            </a:r>
+            <a:r>
+              <a:rPr lang="en-US" sz="2000" dirty="0" err="1">
+                <a:solidFill>
+                  <a:schemeClr val="tx1"/>
+                </a:solidFill>
+                <a:latin typeface="Segoe UI" panose="020B0502040204020203" pitchFamily="34" charset="0"/>
+              </a:rPr>
+              <a:t>InputText</a:t>
+            </a:r>
+            <a:r>
+              <a:rPr lang="en-US" sz="2000" dirty="0">
+                <a:solidFill>
+                  <a:schemeClr val="tx1"/>
+                </a:solidFill>
+                <a:latin typeface="Segoe UI" panose="020B0502040204020203" pitchFamily="34" charset="0"/>
+              </a:rPr>
+              <a:t>, </a:t>
+            </a:r>
+            <a:r>
+              <a:rPr lang="en-US" sz="2000" dirty="0" err="1">
+                <a:solidFill>
+                  <a:schemeClr val="tx1"/>
+                </a:solidFill>
+                <a:latin typeface="Segoe UI" panose="020B0502040204020203" pitchFamily="34" charset="0"/>
+              </a:rPr>
+              <a:t>InputCheckbox</a:t>
+            </a:r>
+            <a:r>
+              <a:rPr lang="en-US" sz="2000" dirty="0">
+                <a:solidFill>
+                  <a:schemeClr val="tx1"/>
+                </a:solidFill>
+                <a:latin typeface="Segoe UI" panose="020B0502040204020203" pitchFamily="34" charset="0"/>
+              </a:rPr>
+              <a:t>, </a:t>
+            </a:r>
+            <a:r>
+              <a:rPr lang="en-US" sz="2000" dirty="0" err="1">
+                <a:solidFill>
+                  <a:schemeClr val="tx1"/>
+                </a:solidFill>
+                <a:latin typeface="Segoe UI" panose="020B0502040204020203" pitchFamily="34" charset="0"/>
+              </a:rPr>
+              <a:t>InputDate</a:t>
+            </a:r>
+            <a:r>
+              <a:rPr lang="en-US" sz="2000" dirty="0">
+                <a:solidFill>
+                  <a:schemeClr val="tx1"/>
+                </a:solidFill>
+                <a:latin typeface="Segoe UI" panose="020B0502040204020203" pitchFamily="34" charset="0"/>
+              </a:rPr>
+              <a:t>, </a:t>
+            </a:r>
+            <a:r>
+              <a:rPr lang="en-US" sz="2000" dirty="0" err="1">
+                <a:solidFill>
+                  <a:schemeClr val="tx1"/>
+                </a:solidFill>
+                <a:latin typeface="Segoe UI" panose="020B0502040204020203" pitchFamily="34" charset="0"/>
+              </a:rPr>
+              <a:t>InputNumber</a:t>
+            </a:r>
+            <a:r>
+              <a:rPr lang="en-US" sz="2000" dirty="0">
+                <a:solidFill>
+                  <a:schemeClr val="tx1"/>
+                </a:solidFill>
+                <a:latin typeface="Segoe UI" panose="020B0502040204020203" pitchFamily="34" charset="0"/>
+              </a:rPr>
+              <a:t>, </a:t>
+            </a:r>
+            <a:r>
+              <a:rPr lang="en-US" sz="2000" dirty="0" err="1">
+                <a:solidFill>
+                  <a:schemeClr val="tx1"/>
+                </a:solidFill>
+                <a:latin typeface="Segoe UI" panose="020B0502040204020203" pitchFamily="34" charset="0"/>
+              </a:rPr>
+              <a:t>InputTextArea</a:t>
+            </a:r>
+            <a:r>
+              <a:rPr lang="en-US" sz="2000" dirty="0">
+                <a:solidFill>
+                  <a:schemeClr val="tx1"/>
+                </a:solidFill>
+                <a:latin typeface="Segoe UI" panose="020B0502040204020203" pitchFamily="34" charset="0"/>
+              </a:rPr>
+              <a:t> and </a:t>
+            </a:r>
+            <a:r>
+              <a:rPr lang="en-US" sz="2000" dirty="0" err="1">
+                <a:solidFill>
+                  <a:schemeClr val="tx1"/>
+                </a:solidFill>
+                <a:latin typeface="Segoe UI" panose="020B0502040204020203" pitchFamily="34" charset="0"/>
+              </a:rPr>
+              <a:t>InputSelect</a:t>
+            </a:r>
+            <a:endParaRPr lang="en-US" sz="2000" dirty="0">
+              <a:solidFill>
+                <a:schemeClr val="tx1"/>
+              </a:solidFill>
+              <a:latin typeface="Segoe UI" panose="020B0502040204020203" pitchFamily="34" charset="0"/>
+            </a:endParaRPr>
+          </a:p>
+          <a:p>
+            <a:pPr marL="342900" indent="-342900" algn="just">
+              <a:buFont typeface="Arial" panose="020B0604020202020204" pitchFamily="34" charset="0"/>
+              <a:buChar char="•"/>
+            </a:pPr>
+            <a:r>
+              <a:rPr lang="en-US" sz="2000">
+                <a:solidFill>
+                  <a:schemeClr val="tx1"/>
+                </a:solidFill>
+                <a:latin typeface="Segoe UI" panose="020B0502040204020203" pitchFamily="34" charset="0"/>
+              </a:rPr>
+              <a:t>Examples: </a:t>
+            </a:r>
+            <a:endParaRPr lang="en-US" sz="2000" dirty="0">
+              <a:solidFill>
+                <a:schemeClr val="tx1"/>
+              </a:solidFill>
+              <a:latin typeface="Segoe UI" panose="020B0502040204020203" pitchFamily="34" charset="0"/>
+            </a:endParaRPr>
+          </a:p>
+          <a:p>
+            <a:pPr algn="just"/>
+            <a:r>
               <a:rPr lang="en-US" sz="2000" dirty="0">
                 <a:solidFill>
                   <a:srgbClr val="FF0000"/>
                 </a:solidFill>
                 <a:latin typeface="Segoe UI" panose="020B0502040204020203" pitchFamily="34" charset="0"/>
               </a:rPr>
-              <a:t>COSAS DE FORMS</a:t>
-            </a:r>
-          </a:p>
-          <a:p>
-            <a:pPr marL="342900" indent="-342900" algn="just">
-              <a:buFont typeface="Arial" panose="020B0604020202020204" pitchFamily="34" charset="0"/>
-              <a:buChar char="•"/>
-            </a:pPr>
-            <a:r>
-              <a:rPr lang="en-US" sz="2000" dirty="0">
+              <a:t>	</a:t>
+            </a:r>
+            <a:r>
+              <a:rPr lang="es-ES" sz="2000" dirty="0">
                 <a:solidFill>
-                  <a:srgbClr val="FF0000"/>
+                  <a:srgbClr val="171717"/>
                 </a:solidFill>
                 <a:latin typeface="Segoe UI" panose="020B0502040204020203" pitchFamily="34" charset="0"/>
               </a:rPr>
-              <a:t>Example: XXXX.YYYYYY</a:t>
-            </a:r>
-          </a:p>
-          <a:p>
-            <a:pPr marL="342900" indent="-342900" algn="just">
-              <a:buFont typeface="Arial" panose="020B0604020202020204" pitchFamily="34" charset="0"/>
-              <a:buChar char="•"/>
-            </a:pPr>
+              <a:t>NetCoreConfBCN23.Binding </a:t>
+            </a:r>
+          </a:p>
+          <a:p>
+            <a:pPr algn="just"/>
+            <a:r>
+              <a:rPr lang="es-ES" sz="2000" dirty="0">
+                <a:solidFill>
+                  <a:srgbClr val="171717"/>
+                </a:solidFill>
+                <a:latin typeface="Segoe UI" panose="020B0502040204020203" pitchFamily="34" charset="0"/>
+              </a:rPr>
+              <a:t>	NetCoreConfBCN23.Forms</a:t>
+            </a:r>
             <a:endParaRPr lang="en-US" sz="2000" dirty="0">
               <a:solidFill>
                 <a:srgbClr val="171717"/>

</xml_diff>

<commit_message>
Cambios presentación y repaso código
</commit_message>
<xml_diff>
--- a/netcoreconf23_BCN_BlazorNoWayHome.pptx
+++ b/netcoreconf23_BCN_BlazorNoWayHome.pptx
@@ -5,7 +5,7 @@
     <p:sldMasterId id="2147483648" r:id="rId1"/>
   </p:sldMasterIdLst>
   <p:notesMasterIdLst>
-    <p:notesMasterId r:id="rId18"/>
+    <p:notesMasterId r:id="rId17"/>
   </p:notesMasterIdLst>
   <p:sldIdLst>
     <p:sldId id="292" r:id="rId2"/>
@@ -19,11 +19,10 @@
     <p:sldId id="309" r:id="rId10"/>
     <p:sldId id="310" r:id="rId11"/>
     <p:sldId id="311" r:id="rId12"/>
-    <p:sldId id="312" r:id="rId13"/>
-    <p:sldId id="313" r:id="rId14"/>
-    <p:sldId id="314" r:id="rId15"/>
-    <p:sldId id="302" r:id="rId16"/>
-    <p:sldId id="281" r:id="rId17"/>
+    <p:sldId id="313" r:id="rId13"/>
+    <p:sldId id="314" r:id="rId14"/>
+    <p:sldId id="302" r:id="rId15"/>
+    <p:sldId id="281" r:id="rId16"/>
   </p:sldIdLst>
   <p:sldSz cx="12192000" cy="6858000"/>
   <p:notesSz cx="6858000" cy="9144000"/>
@@ -4842,7 +4841,7 @@
           <a:p>
             <a:fld id="{939FF663-7E36-284F-93AD-25D19950C905}" type="datetimeFigureOut">
               <a:rPr lang="es-ES_tradnl" smtClean="0"/>
-              <a:t>28/02/2023</a:t>
+              <a:t>01/03/2023</a:t>
             </a:fld>
             <a:endParaRPr lang="es-ES_tradnl"/>
           </a:p>
@@ -5335,7 +5334,7 @@
           <a:p>
             <a:fld id="{5201BD0E-354B-C440-9698-83F7F74945AC}" type="slidenum">
               <a:rPr lang="es-ES_tradnl" smtClean="0"/>
-              <a:t>16</a:t>
+              <a:t>15</a:t>
             </a:fld>
             <a:endParaRPr lang="es-ES_tradnl"/>
           </a:p>
@@ -5501,7 +5500,7 @@
           <a:p>
             <a:fld id="{884406F1-D55D-4EF3-B6E5-F254E6012FCC}" type="datetimeFigureOut">
               <a:rPr lang="es-ES" smtClean="0"/>
-              <a:t>28/02/2023</a:t>
+              <a:t>01/03/2023</a:t>
             </a:fld>
             <a:endParaRPr lang="es-ES"/>
           </a:p>
@@ -5762,7 +5761,7 @@
             <a:fld id="{DC76426A-DF8C-4B33-AC87-8CA5E8B7F10A}" type="datetimeFigureOut">
               <a:rPr lang="es-ES" smtClean="0"/>
               <a:pPr/>
-              <a:t>28/02/2023</a:t>
+              <a:t>01/03/2023</a:t>
             </a:fld>
             <a:endParaRPr lang="es-ES" dirty="0"/>
           </a:p>
@@ -7007,7 +7006,7 @@
             <a:fld id="{DC76426A-DF8C-4B33-AC87-8CA5E8B7F10A}" type="datetimeFigureOut">
               <a:rPr lang="es-ES" smtClean="0"/>
               <a:pPr/>
-              <a:t>28/02/2023</a:t>
+              <a:t>01/03/2023</a:t>
             </a:fld>
             <a:endParaRPr lang="es-ES" dirty="0"/>
           </a:p>
@@ -7379,7 +7378,7 @@
           <a:p>
             <a:fld id="{884406F1-D55D-4EF3-B6E5-F254E6012FCC}" type="datetimeFigureOut">
               <a:rPr lang="es-ES" smtClean="0"/>
-              <a:t>28/02/2023</a:t>
+              <a:t>01/03/2023</a:t>
             </a:fld>
             <a:endParaRPr lang="es-ES"/>
           </a:p>
@@ -8304,7 +8303,7 @@
           <a:p>
             <a:fld id="{884406F1-D55D-4EF3-B6E5-F254E6012FCC}" type="datetimeFigureOut">
               <a:rPr lang="es-ES" smtClean="0"/>
-              <a:t>28/02/2023</a:t>
+              <a:t>01/03/2023</a:t>
             </a:fld>
             <a:endParaRPr lang="es-ES"/>
           </a:p>
@@ -10048,7 +10047,7 @@
           <a:p>
             <a:r>
               <a:rPr lang="es-ES" dirty="0"/>
-              <a:t>.NET 7</a:t>
+              <a:t>CRUD</a:t>
             </a:r>
           </a:p>
         </p:txBody>
@@ -10078,7 +10077,7 @@
           <a:noFill/>
         </p:spPr>
         <p:txBody>
-          <a:bodyPr vert="horz" lIns="91440" tIns="45720" rIns="91440" bIns="45720" rtlCol="0" anchor="ctr">
+          <a:bodyPr vert="horz" lIns="91440" tIns="45720" rIns="91440" bIns="45720" rtlCol="0" anchor="t">
             <a:noAutofit/>
           </a:bodyPr>
           <a:lstStyle>
@@ -10101,7 +10100,10 @@
             </a:lvl1pPr>
           </a:lstStyle>
           <a:p>
-            <a:pPr algn="just"/>
+            <a:pPr marL="342900" indent="-342900" algn="just">
+              <a:buFont typeface="Arial" panose="020B0604020202020204" pitchFamily="34" charset="0"/>
+              <a:buChar char="•"/>
+            </a:pPr>
             <a:r>
               <a:rPr lang="es-ES" sz="2000" dirty="0" err="1">
                 <a:solidFill>
@@ -10109,8 +10111,38 @@
                 </a:solidFill>
                 <a:latin typeface="Segoe UI" panose="020B0502040204020203" pitchFamily="34" charset="0"/>
               </a:rPr>
-              <a:t>aaaa</a:t>
-            </a:r>
+              <a:t>Example</a:t>
+            </a:r>
+            <a:r>
+              <a:rPr lang="es-ES" sz="2000" dirty="0">
+                <a:solidFill>
+                  <a:srgbClr val="171717"/>
+                </a:solidFill>
+                <a:latin typeface="Segoe UI" panose="020B0502040204020203" pitchFamily="34" charset="0"/>
+              </a:rPr>
+              <a:t>: </a:t>
+            </a:r>
+          </a:p>
+          <a:p>
+            <a:pPr algn="just"/>
+            <a:r>
+              <a:rPr lang="es-ES" sz="2000" dirty="0">
+                <a:solidFill>
+                  <a:srgbClr val="171717"/>
+                </a:solidFill>
+                <a:latin typeface="Segoe UI" panose="020B0502040204020203" pitchFamily="34" charset="0"/>
+              </a:rPr>
+              <a:t>	NetCoreConfBCN23.Routing</a:t>
+            </a:r>
+            <a:endParaRPr lang="en-US" sz="2000" dirty="0">
+              <a:solidFill>
+                <a:srgbClr val="171717"/>
+              </a:solidFill>
+              <a:latin typeface="Segoe UI" panose="020B0502040204020203" pitchFamily="34" charset="0"/>
+            </a:endParaRPr>
+          </a:p>
+          <a:p>
+            <a:pPr algn="just"/>
             <a:endParaRPr lang="en-US" sz="2000" dirty="0">
               <a:solidFill>
                 <a:srgbClr val="171717"/>
@@ -10120,131 +10152,126 @@
           </a:p>
         </p:txBody>
       </p:sp>
-    </p:spTree>
-    <p:extLst>
-      <p:ext uri="{BB962C8B-B14F-4D97-AF65-F5344CB8AC3E}">
-        <p14:creationId xmlns:p14="http://schemas.microsoft.com/office/powerpoint/2010/main" val="3064728129"/>
-      </p:ext>
-    </p:extLst>
-  </p:cSld>
-  <p:clrMapOvr>
-    <a:masterClrMapping/>
-  </p:clrMapOvr>
-</p:sld>
-</file>
-
-<file path=ppt/slides/slide13.xml><?xml version="1.0" encoding="utf-8"?>
-<p:sld xmlns:a="http://schemas.openxmlformats.org/drawingml/2006/main" xmlns:r="http://schemas.openxmlformats.org/officeDocument/2006/relationships" xmlns:p="http://schemas.openxmlformats.org/presentationml/2006/main">
-  <p:cSld>
-    <p:spTree>
-      <p:nvGrpSpPr>
-        <p:cNvPr id="1" name=""/>
-        <p:cNvGrpSpPr/>
-        <p:nvPr/>
-      </p:nvGrpSpPr>
-      <p:grpSpPr>
-        <a:xfrm>
-          <a:off x="0" y="0"/>
-          <a:ext cx="0" cy="0"/>
-          <a:chOff x="0" y="0"/>
-          <a:chExt cx="0" cy="0"/>
-        </a:xfrm>
-      </p:grpSpPr>
-      <p:sp>
-        <p:nvSpPr>
-          <p:cNvPr id="5" name="Título 4">
+      <p:pic>
+        <p:nvPicPr>
+          <p:cNvPr id="7" name="Imagen 6">
             <a:extLst>
               <a:ext uri="{FF2B5EF4-FFF2-40B4-BE49-F238E27FC236}">
-                <a16:creationId xmlns:a16="http://schemas.microsoft.com/office/drawing/2014/main" id="{0F5D4E1C-BECE-4044-8955-F7990D60F576}"/>
+                <a16:creationId xmlns:a16="http://schemas.microsoft.com/office/drawing/2014/main" id="{48139B2D-9B16-D22F-7742-C2BA24D5D9AA}"/>
               </a:ext>
             </a:extLst>
           </p:cNvPr>
-          <p:cNvSpPr>
-            <a:spLocks noGrp="1"/>
-          </p:cNvSpPr>
-          <p:nvPr>
-            <p:ph type="title"/>
-          </p:nvPr>
-        </p:nvSpPr>
-        <p:spPr/>
-        <p:txBody>
-          <a:bodyPr/>
-          <a:lstStyle/>
-          <a:p>
-            <a:r>
-              <a:rPr lang="es-ES" dirty="0"/>
-              <a:t>CRUD</a:t>
-            </a:r>
-          </a:p>
-        </p:txBody>
-      </p:sp>
-      <p:sp>
-        <p:nvSpPr>
-          <p:cNvPr id="3" name="Título 4">
-            <a:extLst>
-              <a:ext uri="{FF2B5EF4-FFF2-40B4-BE49-F238E27FC236}">
-                <a16:creationId xmlns:a16="http://schemas.microsoft.com/office/drawing/2014/main" id="{08B4A7D6-21D8-4A2C-86E4-CEFE8DD02180}"/>
-              </a:ext>
-            </a:extLst>
-          </p:cNvPr>
-          <p:cNvSpPr txBox="1">
-            <a:spLocks/>
-          </p:cNvSpPr>
+          <p:cNvPicPr>
+            <a:picLocks noChangeAspect="1"/>
+          </p:cNvPicPr>
           <p:nvPr/>
-        </p:nvSpPr>
+        </p:nvPicPr>
+        <p:blipFill>
+          <a:blip r:embed="rId2"/>
+          <a:stretch>
+            <a:fillRect/>
+          </a:stretch>
+        </p:blipFill>
         <p:spPr>
           <a:xfrm>
-            <a:off x="838200" y="1195523"/>
-            <a:ext cx="6191249" cy="4466953"/>
+            <a:off x="529894" y="1848971"/>
+            <a:ext cx="6807859" cy="3452907"/>
           </a:xfrm>
           <a:prstGeom prst="rect">
             <a:avLst/>
           </a:prstGeom>
-          <a:noFill/>
+          <a:solidFill>
+            <a:srgbClr val="FFFFFF">
+              <a:shade val="85000"/>
+            </a:srgbClr>
+          </a:solidFill>
+          <a:ln w="88900" cap="sq">
+            <a:solidFill>
+              <a:srgbClr val="FFFFFF"/>
+            </a:solidFill>
+            <a:miter lim="800000"/>
+          </a:ln>
+          <a:effectLst>
+            <a:outerShdw blurRad="55000" dist="18000" dir="5400000" algn="tl" rotWithShape="0">
+              <a:srgbClr val="000000">
+                <a:alpha val="40000"/>
+              </a:srgbClr>
+            </a:outerShdw>
+          </a:effectLst>
+          <a:scene3d>
+            <a:camera prst="orthographicFront"/>
+            <a:lightRig rig="twoPt" dir="t">
+              <a:rot lat="0" lon="0" rev="7200000"/>
+            </a:lightRig>
+          </a:scene3d>
+          <a:sp3d>
+            <a:bevelT w="25400" h="19050"/>
+            <a:contourClr>
+              <a:srgbClr val="FFFFFF"/>
+            </a:contourClr>
+          </a:sp3d>
         </p:spPr>
-        <p:txBody>
-          <a:bodyPr vert="horz" lIns="91440" tIns="45720" rIns="91440" bIns="45720" rtlCol="0" anchor="ctr">
-            <a:noAutofit/>
-          </a:bodyPr>
-          <a:lstStyle>
-            <a:lvl1pPr algn="l" defTabSz="914400" rtl="0" eaLnBrk="1" latinLnBrk="0" hangingPunct="1">
-              <a:lnSpc>
-                <a:spcPct val="90000"/>
-              </a:lnSpc>
-              <a:spcBef>
-                <a:spcPct val="0"/>
-              </a:spcBef>
-              <a:buNone/>
-              <a:defRPr sz="3600" kern="1200">
-                <a:solidFill>
-                  <a:srgbClr val="561B64"/>
-                </a:solidFill>
-                <a:latin typeface="+mj-lt"/>
-                <a:ea typeface="+mj-ea"/>
-                <a:cs typeface="+mj-cs"/>
-              </a:defRPr>
-            </a:lvl1pPr>
-          </a:lstStyle>
-          <a:p>
-            <a:pPr algn="just"/>
-            <a:r>
-              <a:rPr lang="es-ES" sz="2000" dirty="0" err="1">
-                <a:solidFill>
-                  <a:srgbClr val="171717"/>
-                </a:solidFill>
-                <a:latin typeface="Segoe UI" panose="020B0502040204020203" pitchFamily="34" charset="0"/>
-              </a:rPr>
-              <a:t>aaaa</a:t>
-            </a:r>
-            <a:endParaRPr lang="en-US" sz="2000" dirty="0">
-              <a:solidFill>
-                <a:srgbClr val="171717"/>
-              </a:solidFill>
-              <a:latin typeface="Segoe UI" panose="020B0502040204020203" pitchFamily="34" charset="0"/>
-            </a:endParaRPr>
-          </a:p>
-        </p:txBody>
-      </p:sp>
+      </p:pic>
+      <p:pic>
+        <p:nvPicPr>
+          <p:cNvPr id="9" name="Imagen 8">
+            <a:extLst>
+              <a:ext uri="{FF2B5EF4-FFF2-40B4-BE49-F238E27FC236}">
+                <a16:creationId xmlns:a16="http://schemas.microsoft.com/office/drawing/2014/main" id="{99B78AFA-5435-767D-5AE7-30DE3E96B63B}"/>
+              </a:ext>
+            </a:extLst>
+          </p:cNvPr>
+          <p:cNvPicPr>
+            <a:picLocks noChangeAspect="1"/>
+          </p:cNvPicPr>
+          <p:nvPr/>
+        </p:nvPicPr>
+        <p:blipFill>
+          <a:blip r:embed="rId3"/>
+          <a:stretch>
+            <a:fillRect/>
+          </a:stretch>
+        </p:blipFill>
+        <p:spPr>
+          <a:xfrm>
+            <a:off x="5414325" y="3949220"/>
+            <a:ext cx="5478149" cy="2237278"/>
+          </a:xfrm>
+          <a:prstGeom prst="rect">
+            <a:avLst/>
+          </a:prstGeom>
+          <a:solidFill>
+            <a:srgbClr val="FFFFFF">
+              <a:shade val="85000"/>
+            </a:srgbClr>
+          </a:solidFill>
+          <a:ln w="88900" cap="sq">
+            <a:solidFill>
+              <a:srgbClr val="FFFFFF"/>
+            </a:solidFill>
+            <a:miter lim="800000"/>
+          </a:ln>
+          <a:effectLst>
+            <a:outerShdw blurRad="55000" dist="18000" dir="5400000" algn="tl" rotWithShape="0">
+              <a:srgbClr val="000000">
+                <a:alpha val="40000"/>
+              </a:srgbClr>
+            </a:outerShdw>
+          </a:effectLst>
+          <a:scene3d>
+            <a:camera prst="orthographicFront"/>
+            <a:lightRig rig="twoPt" dir="t">
+              <a:rot lat="0" lon="0" rev="7200000"/>
+            </a:lightRig>
+          </a:scene3d>
+          <a:sp3d>
+            <a:bevelT w="25400" h="19050"/>
+            <a:contourClr>
+              <a:srgbClr val="FFFFFF"/>
+            </a:contourClr>
+          </a:sp3d>
+        </p:spPr>
+      </p:pic>
     </p:spTree>
     <p:extLst>
       <p:ext uri="{BB962C8B-B14F-4D97-AF65-F5344CB8AC3E}">
@@ -10258,7 +10285,7 @@
 </p:sld>
 </file>
 
-<file path=ppt/slides/slide14.xml><?xml version="1.0" encoding="utf-8"?>
+<file path=ppt/slides/slide13.xml><?xml version="1.0" encoding="utf-8"?>
 <p:sld xmlns:a="http://schemas.openxmlformats.org/drawingml/2006/main" xmlns:r="http://schemas.openxmlformats.org/officeDocument/2006/relationships" xmlns:p="http://schemas.openxmlformats.org/presentationml/2006/main">
   <p:cSld>
     <p:spTree>
@@ -10364,7 +10391,7 @@
 </p:sld>
 </file>
 
-<file path=ppt/slides/slide15.xml><?xml version="1.0" encoding="utf-8"?>
+<file path=ppt/slides/slide14.xml><?xml version="1.0" encoding="utf-8"?>
 <p:sld xmlns:a="http://schemas.openxmlformats.org/drawingml/2006/main" xmlns:r="http://schemas.openxmlformats.org/officeDocument/2006/relationships" xmlns:p="http://schemas.openxmlformats.org/presentationml/2006/main">
   <p:cSld>
     <p:spTree>
@@ -10394,7 +10421,7 @@
 </p:sld>
 </file>
 
-<file path=ppt/slides/slide16.xml><?xml version="1.0" encoding="utf-8"?>
+<file path=ppt/slides/slide15.xml><?xml version="1.0" encoding="utf-8"?>
 <p:sld xmlns:a="http://schemas.openxmlformats.org/drawingml/2006/main" xmlns:r="http://schemas.openxmlformats.org/officeDocument/2006/relationships" xmlns:p="http://schemas.openxmlformats.org/presentationml/2006/main">
   <p:cSld>
     <p:bg>
@@ -12033,16 +12060,10 @@
           <a:lstStyle/>
           <a:p>
             <a:r>
-              <a:rPr lang="es-ES" sz="2400" dirty="0" err="1">
-                <a:latin typeface="+mn-lt"/>
-              </a:rPr>
-              <a:t>Blazor</a:t>
-            </a:r>
-            <a:r>
               <a:rPr lang="es-ES" sz="2400" dirty="0">
                 <a:latin typeface="+mn-lt"/>
               </a:rPr>
-              <a:t> in .NET 7</a:t>
+              <a:t>CRUD</a:t>
             </a:r>
           </a:p>
         </p:txBody>

</xml_diff>